<commit_message>
Added a few presentations, small changes to notes/exercises
Added a few presentations, small changes to notes/exercises
</commit_message>
<xml_diff>
--- a/CSharpProgramming/Presentations/Pro1.pptx
+++ b/CSharpProgramming/Presentations/Pro1.pptx
@@ -29,16 +29,17 @@
     <p:sldId id="295" r:id="rId23"/>
     <p:sldId id="296" r:id="rId24"/>
     <p:sldId id="297" r:id="rId25"/>
-    <p:sldId id="257" r:id="rId26"/>
-    <p:sldId id="299" r:id="rId27"/>
-    <p:sldId id="300" r:id="rId28"/>
-    <p:sldId id="301" r:id="rId29"/>
-    <p:sldId id="298" r:id="rId30"/>
-    <p:sldId id="302" r:id="rId31"/>
-    <p:sldId id="303" r:id="rId32"/>
-    <p:sldId id="304" r:id="rId33"/>
-    <p:sldId id="305" r:id="rId34"/>
-    <p:sldId id="306" r:id="rId35"/>
+    <p:sldId id="307" r:id="rId26"/>
+    <p:sldId id="257" r:id="rId27"/>
+    <p:sldId id="299" r:id="rId28"/>
+    <p:sldId id="300" r:id="rId29"/>
+    <p:sldId id="301" r:id="rId30"/>
+    <p:sldId id="298" r:id="rId31"/>
+    <p:sldId id="302" r:id="rId32"/>
+    <p:sldId id="303" r:id="rId33"/>
+    <p:sldId id="304" r:id="rId34"/>
+    <p:sldId id="305" r:id="rId35"/>
+    <p:sldId id="306" r:id="rId36"/>
   </p:sldIdLst>
   <p:sldSz cx="12192000" cy="6858000"/>
   <p:notesSz cx="6858000" cy="9144000"/>
@@ -276,7 +277,7 @@
           <a:p>
             <a:fld id="{E15B7D8E-2A20-4C0E-991C-872DBB7459A8}" type="datetimeFigureOut">
               <a:rPr lang="da-DK" smtClean="0"/>
-              <a:t>14-09-2017</a:t>
+              <a:t>19-09-2017</a:t>
             </a:fld>
             <a:endParaRPr lang="da-DK"/>
           </a:p>
@@ -446,7 +447,7 @@
           <a:p>
             <a:fld id="{E15B7D8E-2A20-4C0E-991C-872DBB7459A8}" type="datetimeFigureOut">
               <a:rPr lang="da-DK" smtClean="0"/>
-              <a:t>14-09-2017</a:t>
+              <a:t>19-09-2017</a:t>
             </a:fld>
             <a:endParaRPr lang="da-DK"/>
           </a:p>
@@ -626,7 +627,7 @@
           <a:p>
             <a:fld id="{E15B7D8E-2A20-4C0E-991C-872DBB7459A8}" type="datetimeFigureOut">
               <a:rPr lang="da-DK" smtClean="0"/>
-              <a:t>14-09-2017</a:t>
+              <a:t>19-09-2017</a:t>
             </a:fld>
             <a:endParaRPr lang="da-DK"/>
           </a:p>
@@ -796,7 +797,7 @@
           <a:p>
             <a:fld id="{E15B7D8E-2A20-4C0E-991C-872DBB7459A8}" type="datetimeFigureOut">
               <a:rPr lang="da-DK" smtClean="0"/>
-              <a:t>14-09-2017</a:t>
+              <a:t>19-09-2017</a:t>
             </a:fld>
             <a:endParaRPr lang="da-DK"/>
           </a:p>
@@ -1042,7 +1043,7 @@
           <a:p>
             <a:fld id="{E15B7D8E-2A20-4C0E-991C-872DBB7459A8}" type="datetimeFigureOut">
               <a:rPr lang="da-DK" smtClean="0"/>
-              <a:t>14-09-2017</a:t>
+              <a:t>19-09-2017</a:t>
             </a:fld>
             <a:endParaRPr lang="da-DK"/>
           </a:p>
@@ -1274,7 +1275,7 @@
           <a:p>
             <a:fld id="{E15B7D8E-2A20-4C0E-991C-872DBB7459A8}" type="datetimeFigureOut">
               <a:rPr lang="da-DK" smtClean="0"/>
-              <a:t>14-09-2017</a:t>
+              <a:t>19-09-2017</a:t>
             </a:fld>
             <a:endParaRPr lang="da-DK"/>
           </a:p>
@@ -1641,7 +1642,7 @@
           <a:p>
             <a:fld id="{E15B7D8E-2A20-4C0E-991C-872DBB7459A8}" type="datetimeFigureOut">
               <a:rPr lang="da-DK" smtClean="0"/>
-              <a:t>14-09-2017</a:t>
+              <a:t>19-09-2017</a:t>
             </a:fld>
             <a:endParaRPr lang="da-DK"/>
           </a:p>
@@ -1759,7 +1760,7 @@
           <a:p>
             <a:fld id="{E15B7D8E-2A20-4C0E-991C-872DBB7459A8}" type="datetimeFigureOut">
               <a:rPr lang="da-DK" smtClean="0"/>
-              <a:t>14-09-2017</a:t>
+              <a:t>19-09-2017</a:t>
             </a:fld>
             <a:endParaRPr lang="da-DK"/>
           </a:p>
@@ -1854,7 +1855,7 @@
           <a:p>
             <a:fld id="{E15B7D8E-2A20-4C0E-991C-872DBB7459A8}" type="datetimeFigureOut">
               <a:rPr lang="da-DK" smtClean="0"/>
-              <a:t>14-09-2017</a:t>
+              <a:t>19-09-2017</a:t>
             </a:fld>
             <a:endParaRPr lang="da-DK"/>
           </a:p>
@@ -2131,7 +2132,7 @@
           <a:p>
             <a:fld id="{E15B7D8E-2A20-4C0E-991C-872DBB7459A8}" type="datetimeFigureOut">
               <a:rPr lang="da-DK" smtClean="0"/>
-              <a:t>14-09-2017</a:t>
+              <a:t>19-09-2017</a:t>
             </a:fld>
             <a:endParaRPr lang="da-DK"/>
           </a:p>
@@ -2384,7 +2385,7 @@
           <a:p>
             <a:fld id="{E15B7D8E-2A20-4C0E-991C-872DBB7459A8}" type="datetimeFigureOut">
               <a:rPr lang="da-DK" smtClean="0"/>
-              <a:t>14-09-2017</a:t>
+              <a:t>19-09-2017</a:t>
             </a:fld>
             <a:endParaRPr lang="da-DK"/>
           </a:p>
@@ -2597,7 +2598,7 @@
           <a:p>
             <a:fld id="{E15B7D8E-2A20-4C0E-991C-872DBB7459A8}" type="datetimeFigureOut">
               <a:rPr lang="da-DK" smtClean="0"/>
-              <a:t>14-09-2017</a:t>
+              <a:t>19-09-2017</a:t>
             </a:fld>
             <a:endParaRPr lang="da-DK"/>
           </a:p>
@@ -5083,55 +5084,31 @@
               <a:rPr lang="en-US" sz="2400">
                 <a:latin typeface="Consolas" panose="020B0609020204030204" pitchFamily="49" charset="0"/>
               </a:rPr>
-              <a:t>= </a:t>
+              <a:t>= netPrice</a:t>
+            </a:r>
+            <a:r>
+              <a:rPr lang="en-US" sz="2400" smtClean="0">
+                <a:latin typeface="Consolas" panose="020B0609020204030204" pitchFamily="49" charset="0"/>
+              </a:rPr>
+              <a:t> </a:t>
             </a:r>
             <a:r>
               <a:rPr lang="en-US" sz="2400">
                 <a:latin typeface="Consolas" panose="020B0609020204030204" pitchFamily="49" charset="0"/>
               </a:rPr>
-              <a:t>netPrice</a:t>
+              <a:t>* (1.00 + tax</a:t>
             </a:r>
             <a:r>
               <a:rPr lang="en-US" sz="2400" smtClean="0">
                 <a:latin typeface="Consolas" panose="020B0609020204030204" pitchFamily="49" charset="0"/>
               </a:rPr>
-              <a:t> </a:t>
+              <a:t>) </a:t>
             </a:r>
             <a:r>
               <a:rPr lang="en-US" sz="2400">
                 <a:latin typeface="Consolas" panose="020B0609020204030204" pitchFamily="49" charset="0"/>
               </a:rPr>
-              <a:t>* (1.00 </a:t>
-            </a:r>
-            <a:r>
-              <a:rPr lang="en-US" sz="2400">
-                <a:latin typeface="Consolas" panose="020B0609020204030204" pitchFamily="49" charset="0"/>
-              </a:rPr>
-              <a:t>+ </a:t>
-            </a:r>
-            <a:r>
-              <a:rPr lang="en-US" sz="2400">
-                <a:latin typeface="Consolas" panose="020B0609020204030204" pitchFamily="49" charset="0"/>
-              </a:rPr>
-              <a:t>tax</a:t>
-            </a:r>
-            <a:r>
-              <a:rPr lang="en-US" sz="2400" smtClean="0">
-                <a:latin typeface="Consolas" panose="020B0609020204030204" pitchFamily="49" charset="0"/>
-              </a:rPr>
-              <a:t>) </a:t>
-            </a:r>
-            <a:r>
-              <a:rPr lang="en-US" sz="2400">
-                <a:latin typeface="Consolas" panose="020B0609020204030204" pitchFamily="49" charset="0"/>
-              </a:rPr>
-              <a:t>+ </a:t>
-            </a:r>
-            <a:r>
-              <a:rPr lang="en-US" sz="2400">
-                <a:latin typeface="Consolas" panose="020B0609020204030204" pitchFamily="49" charset="0"/>
-              </a:rPr>
-              <a:t>shipping</a:t>
+              <a:t>+ shipping</a:t>
             </a:r>
             <a:r>
               <a:rPr lang="da-DK" sz="2400" smtClean="0">
@@ -5275,55 +5252,31 @@
               <a:rPr lang="en-US" sz="2400">
                 <a:latin typeface="Consolas" panose="020B0609020204030204" pitchFamily="49" charset="0"/>
               </a:rPr>
-              <a:t>= </a:t>
+              <a:t>= netPrice</a:t>
+            </a:r>
+            <a:r>
+              <a:rPr lang="en-US" sz="2400" smtClean="0">
+                <a:latin typeface="Consolas" panose="020B0609020204030204" pitchFamily="49" charset="0"/>
+              </a:rPr>
+              <a:t> </a:t>
             </a:r>
             <a:r>
               <a:rPr lang="en-US" sz="2400">
                 <a:latin typeface="Consolas" panose="020B0609020204030204" pitchFamily="49" charset="0"/>
               </a:rPr>
-              <a:t>netPrice</a:t>
+              <a:t>* (1.00 + tax</a:t>
             </a:r>
             <a:r>
               <a:rPr lang="en-US" sz="2400" smtClean="0">
                 <a:latin typeface="Consolas" panose="020B0609020204030204" pitchFamily="49" charset="0"/>
               </a:rPr>
-              <a:t> </a:t>
+              <a:t>) </a:t>
             </a:r>
             <a:r>
               <a:rPr lang="en-US" sz="2400">
                 <a:latin typeface="Consolas" panose="020B0609020204030204" pitchFamily="49" charset="0"/>
               </a:rPr>
-              <a:t>* (1.00 </a:t>
-            </a:r>
-            <a:r>
-              <a:rPr lang="en-US" sz="2400">
-                <a:latin typeface="Consolas" panose="020B0609020204030204" pitchFamily="49" charset="0"/>
-              </a:rPr>
-              <a:t>+ </a:t>
-            </a:r>
-            <a:r>
-              <a:rPr lang="en-US" sz="2400">
-                <a:latin typeface="Consolas" panose="020B0609020204030204" pitchFamily="49" charset="0"/>
-              </a:rPr>
-              <a:t>tax</a:t>
-            </a:r>
-            <a:r>
-              <a:rPr lang="en-US" sz="2400" smtClean="0">
-                <a:latin typeface="Consolas" panose="020B0609020204030204" pitchFamily="49" charset="0"/>
-              </a:rPr>
-              <a:t>) </a:t>
-            </a:r>
-            <a:r>
-              <a:rPr lang="en-US" sz="2400">
-                <a:latin typeface="Consolas" panose="020B0609020204030204" pitchFamily="49" charset="0"/>
-              </a:rPr>
-              <a:t>+ </a:t>
-            </a:r>
-            <a:r>
-              <a:rPr lang="en-US" sz="2400">
-                <a:latin typeface="Consolas" panose="020B0609020204030204" pitchFamily="49" charset="0"/>
-              </a:rPr>
-              <a:t>shipping</a:t>
+              <a:t>+ shipping</a:t>
             </a:r>
             <a:r>
               <a:rPr lang="da-DK" sz="2400" smtClean="0">
@@ -6676,7 +6629,18 @@
                 </a:solidFill>
                 <a:latin typeface="Consolas" panose="020B0609020204030204" pitchFamily="49" charset="0"/>
               </a:rPr>
-              <a:t>= </a:t>
+              <a:t>= netPrice</a:t>
+            </a:r>
+            <a:r>
+              <a:rPr lang="en-US" sz="2400" smtClean="0">
+                <a:solidFill>
+                  <a:schemeClr val="bg1">
+                    <a:lumMod val="85000"/>
+                  </a:schemeClr>
+                </a:solidFill>
+                <a:latin typeface="Consolas" panose="020B0609020204030204" pitchFamily="49" charset="0"/>
+              </a:rPr>
+              <a:t> </a:t>
             </a:r>
             <a:r>
               <a:rPr lang="en-US" sz="2400">
@@ -6687,7 +6651,7 @@
                 </a:solidFill>
                 <a:latin typeface="Consolas" panose="020B0609020204030204" pitchFamily="49" charset="0"/>
               </a:rPr>
-              <a:t>netPrice</a:t>
+              <a:t>* (1.00 + tax</a:t>
             </a:r>
             <a:r>
               <a:rPr lang="en-US" sz="2400" smtClean="0">
@@ -6698,7 +6662,7 @@
                 </a:solidFill>
                 <a:latin typeface="Consolas" panose="020B0609020204030204" pitchFamily="49" charset="0"/>
               </a:rPr>
-              <a:t> </a:t>
+              <a:t>) </a:t>
             </a:r>
             <a:r>
               <a:rPr lang="en-US" sz="2400">
@@ -6709,62 +6673,7 @@
                 </a:solidFill>
                 <a:latin typeface="Consolas" panose="020B0609020204030204" pitchFamily="49" charset="0"/>
               </a:rPr>
-              <a:t>* (1.00 </a:t>
-            </a:r>
-            <a:r>
-              <a:rPr lang="en-US" sz="2400">
-                <a:solidFill>
-                  <a:schemeClr val="bg1">
-                    <a:lumMod val="85000"/>
-                  </a:schemeClr>
-                </a:solidFill>
-                <a:latin typeface="Consolas" panose="020B0609020204030204" pitchFamily="49" charset="0"/>
-              </a:rPr>
-              <a:t>+ </a:t>
-            </a:r>
-            <a:r>
-              <a:rPr lang="en-US" sz="2400">
-                <a:solidFill>
-                  <a:schemeClr val="bg1">
-                    <a:lumMod val="85000"/>
-                  </a:schemeClr>
-                </a:solidFill>
-                <a:latin typeface="Consolas" panose="020B0609020204030204" pitchFamily="49" charset="0"/>
-              </a:rPr>
-              <a:t>tax</a:t>
-            </a:r>
-            <a:r>
-              <a:rPr lang="en-US" sz="2400" smtClean="0">
-                <a:solidFill>
-                  <a:schemeClr val="bg1">
-                    <a:lumMod val="85000"/>
-                  </a:schemeClr>
-                </a:solidFill>
-                <a:latin typeface="Consolas" panose="020B0609020204030204" pitchFamily="49" charset="0"/>
-              </a:rPr>
-              <a:t>) </a:t>
-            </a:r>
-            <a:r>
-              <a:rPr lang="en-US" sz="2400">
-                <a:solidFill>
-                  <a:schemeClr val="bg1">
-                    <a:lumMod val="85000"/>
-                  </a:schemeClr>
-                </a:solidFill>
-                <a:latin typeface="Consolas" panose="020B0609020204030204" pitchFamily="49" charset="0"/>
-              </a:rPr>
-              <a:t>+ </a:t>
-            </a:r>
-            <a:r>
-              <a:rPr lang="en-US" sz="2400">
-                <a:solidFill>
-                  <a:schemeClr val="bg1">
-                    <a:lumMod val="85000"/>
-                  </a:schemeClr>
-                </a:solidFill>
-                <a:latin typeface="Consolas" panose="020B0609020204030204" pitchFamily="49" charset="0"/>
-              </a:rPr>
-              <a:t>shipping</a:t>
+              <a:t>+ shipping</a:t>
             </a:r>
             <a:r>
               <a:rPr lang="da-DK" sz="2400" smtClean="0">
@@ -6983,7 +6892,18 @@
                 </a:solidFill>
                 <a:latin typeface="Consolas" panose="020B0609020204030204" pitchFamily="49" charset="0"/>
               </a:rPr>
-              <a:t>= </a:t>
+              <a:t>= netPrice</a:t>
+            </a:r>
+            <a:r>
+              <a:rPr lang="en-US" sz="2400" smtClean="0">
+                <a:solidFill>
+                  <a:schemeClr val="bg1">
+                    <a:lumMod val="85000"/>
+                  </a:schemeClr>
+                </a:solidFill>
+                <a:latin typeface="Consolas" panose="020B0609020204030204" pitchFamily="49" charset="0"/>
+              </a:rPr>
+              <a:t> </a:t>
             </a:r>
             <a:r>
               <a:rPr lang="en-US" sz="2400">
@@ -6994,7 +6914,7 @@
                 </a:solidFill>
                 <a:latin typeface="Consolas" panose="020B0609020204030204" pitchFamily="49" charset="0"/>
               </a:rPr>
-              <a:t>netPrice</a:t>
+              <a:t>* (1.00 + tax</a:t>
             </a:r>
             <a:r>
               <a:rPr lang="en-US" sz="2400" smtClean="0">
@@ -7005,7 +6925,7 @@
                 </a:solidFill>
                 <a:latin typeface="Consolas" panose="020B0609020204030204" pitchFamily="49" charset="0"/>
               </a:rPr>
-              <a:t> </a:t>
+              <a:t>) </a:t>
             </a:r>
             <a:r>
               <a:rPr lang="en-US" sz="2400">
@@ -7016,62 +6936,7 @@
                 </a:solidFill>
                 <a:latin typeface="Consolas" panose="020B0609020204030204" pitchFamily="49" charset="0"/>
               </a:rPr>
-              <a:t>* (1.00 </a:t>
-            </a:r>
-            <a:r>
-              <a:rPr lang="en-US" sz="2400">
-                <a:solidFill>
-                  <a:schemeClr val="bg1">
-                    <a:lumMod val="85000"/>
-                  </a:schemeClr>
-                </a:solidFill>
-                <a:latin typeface="Consolas" panose="020B0609020204030204" pitchFamily="49" charset="0"/>
-              </a:rPr>
-              <a:t>+ </a:t>
-            </a:r>
-            <a:r>
-              <a:rPr lang="en-US" sz="2400">
-                <a:solidFill>
-                  <a:schemeClr val="bg1">
-                    <a:lumMod val="85000"/>
-                  </a:schemeClr>
-                </a:solidFill>
-                <a:latin typeface="Consolas" panose="020B0609020204030204" pitchFamily="49" charset="0"/>
-              </a:rPr>
-              <a:t>tax</a:t>
-            </a:r>
-            <a:r>
-              <a:rPr lang="en-US" sz="2400" smtClean="0">
-                <a:solidFill>
-                  <a:schemeClr val="bg1">
-                    <a:lumMod val="85000"/>
-                  </a:schemeClr>
-                </a:solidFill>
-                <a:latin typeface="Consolas" panose="020B0609020204030204" pitchFamily="49" charset="0"/>
-              </a:rPr>
-              <a:t>) </a:t>
-            </a:r>
-            <a:r>
-              <a:rPr lang="en-US" sz="2400">
-                <a:solidFill>
-                  <a:schemeClr val="bg1">
-                    <a:lumMod val="85000"/>
-                  </a:schemeClr>
-                </a:solidFill>
-                <a:latin typeface="Consolas" panose="020B0609020204030204" pitchFamily="49" charset="0"/>
-              </a:rPr>
-              <a:t>+ </a:t>
-            </a:r>
-            <a:r>
-              <a:rPr lang="en-US" sz="2400">
-                <a:solidFill>
-                  <a:schemeClr val="bg1">
-                    <a:lumMod val="85000"/>
-                  </a:schemeClr>
-                </a:solidFill>
-                <a:latin typeface="Consolas" panose="020B0609020204030204" pitchFamily="49" charset="0"/>
-              </a:rPr>
-              <a:t>shipping</a:t>
+              <a:t>+ shipping</a:t>
             </a:r>
             <a:r>
               <a:rPr lang="da-DK" sz="2400" smtClean="0">
@@ -7290,7 +7155,18 @@
                 </a:solidFill>
                 <a:latin typeface="Consolas" panose="020B0609020204030204" pitchFamily="49" charset="0"/>
               </a:rPr>
-              <a:t>= </a:t>
+              <a:t>= netPrice</a:t>
+            </a:r>
+            <a:r>
+              <a:rPr lang="en-US" sz="2400" smtClean="0">
+                <a:solidFill>
+                  <a:schemeClr val="bg1">
+                    <a:lumMod val="85000"/>
+                  </a:schemeClr>
+                </a:solidFill>
+                <a:latin typeface="Consolas" panose="020B0609020204030204" pitchFamily="49" charset="0"/>
+              </a:rPr>
+              <a:t> </a:t>
             </a:r>
             <a:r>
               <a:rPr lang="en-US" sz="2400">
@@ -7301,7 +7177,7 @@
                 </a:solidFill>
                 <a:latin typeface="Consolas" panose="020B0609020204030204" pitchFamily="49" charset="0"/>
               </a:rPr>
-              <a:t>netPrice</a:t>
+              <a:t>* (1.00 + tax</a:t>
             </a:r>
             <a:r>
               <a:rPr lang="en-US" sz="2400" smtClean="0">
@@ -7312,7 +7188,7 @@
                 </a:solidFill>
                 <a:latin typeface="Consolas" panose="020B0609020204030204" pitchFamily="49" charset="0"/>
               </a:rPr>
-              <a:t> </a:t>
+              <a:t>) </a:t>
             </a:r>
             <a:r>
               <a:rPr lang="en-US" sz="2400">
@@ -7323,62 +7199,7 @@
                 </a:solidFill>
                 <a:latin typeface="Consolas" panose="020B0609020204030204" pitchFamily="49" charset="0"/>
               </a:rPr>
-              <a:t>* (1.00 </a:t>
-            </a:r>
-            <a:r>
-              <a:rPr lang="en-US" sz="2400">
-                <a:solidFill>
-                  <a:schemeClr val="bg1">
-                    <a:lumMod val="85000"/>
-                  </a:schemeClr>
-                </a:solidFill>
-                <a:latin typeface="Consolas" panose="020B0609020204030204" pitchFamily="49" charset="0"/>
-              </a:rPr>
-              <a:t>+ </a:t>
-            </a:r>
-            <a:r>
-              <a:rPr lang="en-US" sz="2400">
-                <a:solidFill>
-                  <a:schemeClr val="bg1">
-                    <a:lumMod val="85000"/>
-                  </a:schemeClr>
-                </a:solidFill>
-                <a:latin typeface="Consolas" panose="020B0609020204030204" pitchFamily="49" charset="0"/>
-              </a:rPr>
-              <a:t>tax</a:t>
-            </a:r>
-            <a:r>
-              <a:rPr lang="en-US" sz="2400" smtClean="0">
-                <a:solidFill>
-                  <a:schemeClr val="bg1">
-                    <a:lumMod val="85000"/>
-                  </a:schemeClr>
-                </a:solidFill>
-                <a:latin typeface="Consolas" panose="020B0609020204030204" pitchFamily="49" charset="0"/>
-              </a:rPr>
-              <a:t>) </a:t>
-            </a:r>
-            <a:r>
-              <a:rPr lang="en-US" sz="2400">
-                <a:solidFill>
-                  <a:schemeClr val="bg1">
-                    <a:lumMod val="85000"/>
-                  </a:schemeClr>
-                </a:solidFill>
-                <a:latin typeface="Consolas" panose="020B0609020204030204" pitchFamily="49" charset="0"/>
-              </a:rPr>
-              <a:t>+ </a:t>
-            </a:r>
-            <a:r>
-              <a:rPr lang="en-US" sz="2400">
-                <a:solidFill>
-                  <a:schemeClr val="bg1">
-                    <a:lumMod val="85000"/>
-                  </a:schemeClr>
-                </a:solidFill>
-                <a:latin typeface="Consolas" panose="020B0609020204030204" pitchFamily="49" charset="0"/>
-              </a:rPr>
-              <a:t>shipping</a:t>
+              <a:t>+ shipping</a:t>
             </a:r>
             <a:r>
               <a:rPr lang="da-DK" sz="2400" smtClean="0">
@@ -7597,7 +7418,18 @@
                 </a:solidFill>
                 <a:latin typeface="Consolas" panose="020B0609020204030204" pitchFamily="49" charset="0"/>
               </a:rPr>
-              <a:t>= </a:t>
+              <a:t>= netPrice</a:t>
+            </a:r>
+            <a:r>
+              <a:rPr lang="en-US" sz="2400" smtClean="0">
+                <a:solidFill>
+                  <a:schemeClr val="bg1">
+                    <a:lumMod val="85000"/>
+                  </a:schemeClr>
+                </a:solidFill>
+                <a:latin typeface="Consolas" panose="020B0609020204030204" pitchFamily="49" charset="0"/>
+              </a:rPr>
+              <a:t> </a:t>
             </a:r>
             <a:r>
               <a:rPr lang="en-US" sz="2400">
@@ -7608,7 +7440,7 @@
                 </a:solidFill>
                 <a:latin typeface="Consolas" panose="020B0609020204030204" pitchFamily="49" charset="0"/>
               </a:rPr>
-              <a:t>netPrice</a:t>
+              <a:t>* (1.00 + tax</a:t>
             </a:r>
             <a:r>
               <a:rPr lang="en-US" sz="2400" smtClean="0">
@@ -7619,7 +7451,7 @@
                 </a:solidFill>
                 <a:latin typeface="Consolas" panose="020B0609020204030204" pitchFamily="49" charset="0"/>
               </a:rPr>
-              <a:t> </a:t>
+              <a:t>) </a:t>
             </a:r>
             <a:r>
               <a:rPr lang="en-US" sz="2400">
@@ -7630,62 +7462,7 @@
                 </a:solidFill>
                 <a:latin typeface="Consolas" panose="020B0609020204030204" pitchFamily="49" charset="0"/>
               </a:rPr>
-              <a:t>* (1.00 </a:t>
-            </a:r>
-            <a:r>
-              <a:rPr lang="en-US" sz="2400">
-                <a:solidFill>
-                  <a:schemeClr val="bg1">
-                    <a:lumMod val="85000"/>
-                  </a:schemeClr>
-                </a:solidFill>
-                <a:latin typeface="Consolas" panose="020B0609020204030204" pitchFamily="49" charset="0"/>
-              </a:rPr>
-              <a:t>+ </a:t>
-            </a:r>
-            <a:r>
-              <a:rPr lang="en-US" sz="2400">
-                <a:solidFill>
-                  <a:schemeClr val="bg1">
-                    <a:lumMod val="85000"/>
-                  </a:schemeClr>
-                </a:solidFill>
-                <a:latin typeface="Consolas" panose="020B0609020204030204" pitchFamily="49" charset="0"/>
-              </a:rPr>
-              <a:t>tax</a:t>
-            </a:r>
-            <a:r>
-              <a:rPr lang="en-US" sz="2400" smtClean="0">
-                <a:solidFill>
-                  <a:schemeClr val="bg1">
-                    <a:lumMod val="85000"/>
-                  </a:schemeClr>
-                </a:solidFill>
-                <a:latin typeface="Consolas" panose="020B0609020204030204" pitchFamily="49" charset="0"/>
-              </a:rPr>
-              <a:t>) </a:t>
-            </a:r>
-            <a:r>
-              <a:rPr lang="en-US" sz="2400">
-                <a:solidFill>
-                  <a:schemeClr val="bg1">
-                    <a:lumMod val="85000"/>
-                  </a:schemeClr>
-                </a:solidFill>
-                <a:latin typeface="Consolas" panose="020B0609020204030204" pitchFamily="49" charset="0"/>
-              </a:rPr>
-              <a:t>+ </a:t>
-            </a:r>
-            <a:r>
-              <a:rPr lang="en-US" sz="2400">
-                <a:solidFill>
-                  <a:schemeClr val="bg1">
-                    <a:lumMod val="85000"/>
-                  </a:schemeClr>
-                </a:solidFill>
-                <a:latin typeface="Consolas" panose="020B0609020204030204" pitchFamily="49" charset="0"/>
-              </a:rPr>
-              <a:t>shipping</a:t>
+              <a:t>+ shipping</a:t>
             </a:r>
             <a:r>
               <a:rPr lang="da-DK" sz="2400" smtClean="0">
@@ -7916,7 +7693,18 @@
                 </a:solidFill>
                 <a:latin typeface="Consolas" panose="020B0609020204030204" pitchFamily="49" charset="0"/>
               </a:rPr>
-              <a:t>= </a:t>
+              <a:t>= netPrice</a:t>
+            </a:r>
+            <a:r>
+              <a:rPr lang="en-US" sz="2400" smtClean="0">
+                <a:solidFill>
+                  <a:schemeClr val="bg1">
+                    <a:lumMod val="85000"/>
+                  </a:schemeClr>
+                </a:solidFill>
+                <a:latin typeface="Consolas" panose="020B0609020204030204" pitchFamily="49" charset="0"/>
+              </a:rPr>
+              <a:t> </a:t>
             </a:r>
             <a:r>
               <a:rPr lang="en-US" sz="2400">
@@ -7927,7 +7715,7 @@
                 </a:solidFill>
                 <a:latin typeface="Consolas" panose="020B0609020204030204" pitchFamily="49" charset="0"/>
               </a:rPr>
-              <a:t>netPrice</a:t>
+              <a:t>* (1.00 + tax</a:t>
             </a:r>
             <a:r>
               <a:rPr lang="en-US" sz="2400" smtClean="0">
@@ -7938,7 +7726,7 @@
                 </a:solidFill>
                 <a:latin typeface="Consolas" panose="020B0609020204030204" pitchFamily="49" charset="0"/>
               </a:rPr>
-              <a:t> </a:t>
+              <a:t>) </a:t>
             </a:r>
             <a:r>
               <a:rPr lang="en-US" sz="2400">
@@ -7949,62 +7737,7 @@
                 </a:solidFill>
                 <a:latin typeface="Consolas" panose="020B0609020204030204" pitchFamily="49" charset="0"/>
               </a:rPr>
-              <a:t>* (1.00 </a:t>
-            </a:r>
-            <a:r>
-              <a:rPr lang="en-US" sz="2400">
-                <a:solidFill>
-                  <a:schemeClr val="bg1">
-                    <a:lumMod val="85000"/>
-                  </a:schemeClr>
-                </a:solidFill>
-                <a:latin typeface="Consolas" panose="020B0609020204030204" pitchFamily="49" charset="0"/>
-              </a:rPr>
-              <a:t>+ </a:t>
-            </a:r>
-            <a:r>
-              <a:rPr lang="en-US" sz="2400">
-                <a:solidFill>
-                  <a:schemeClr val="bg1">
-                    <a:lumMod val="85000"/>
-                  </a:schemeClr>
-                </a:solidFill>
-                <a:latin typeface="Consolas" panose="020B0609020204030204" pitchFamily="49" charset="0"/>
-              </a:rPr>
-              <a:t>tax</a:t>
-            </a:r>
-            <a:r>
-              <a:rPr lang="en-US" sz="2400" smtClean="0">
-                <a:solidFill>
-                  <a:schemeClr val="bg1">
-                    <a:lumMod val="85000"/>
-                  </a:schemeClr>
-                </a:solidFill>
-                <a:latin typeface="Consolas" panose="020B0609020204030204" pitchFamily="49" charset="0"/>
-              </a:rPr>
-              <a:t>) </a:t>
-            </a:r>
-            <a:r>
-              <a:rPr lang="en-US" sz="2400">
-                <a:solidFill>
-                  <a:schemeClr val="bg1">
-                    <a:lumMod val="85000"/>
-                  </a:schemeClr>
-                </a:solidFill>
-                <a:latin typeface="Consolas" panose="020B0609020204030204" pitchFamily="49" charset="0"/>
-              </a:rPr>
-              <a:t>+ </a:t>
-            </a:r>
-            <a:r>
-              <a:rPr lang="en-US" sz="2400">
-                <a:solidFill>
-                  <a:schemeClr val="bg1">
-                    <a:lumMod val="85000"/>
-                  </a:schemeClr>
-                </a:solidFill>
-                <a:latin typeface="Consolas" panose="020B0609020204030204" pitchFamily="49" charset="0"/>
-              </a:rPr>
-              <a:t>shipping</a:t>
+              <a:t>+ shipping</a:t>
             </a:r>
             <a:r>
               <a:rPr lang="da-DK" sz="2400" smtClean="0">
@@ -8043,16 +7776,7 @@
                 </a:solidFill>
                 <a:latin typeface="Consolas" panose="020B0609020204030204" pitchFamily="49" charset="0"/>
               </a:rPr>
-              <a:t>("Dividing age by 1.3 </a:t>
-            </a:r>
-            <a:r>
-              <a:rPr lang="en-US" sz="2400">
-                <a:solidFill>
-                  <a:srgbClr val="C00000"/>
-                </a:solidFill>
-                <a:latin typeface="Consolas" panose="020B0609020204030204" pitchFamily="49" charset="0"/>
-              </a:rPr>
-              <a:t>is </a:t>
+              <a:t>("Dividing age by 1.3 is </a:t>
             </a:r>
             <a:r>
               <a:rPr lang="en-US" sz="2400" b="1" smtClean="0">
@@ -8105,6 +7829,86 @@
 </file>
 
 <file path=ppt/slides/slide25.xml><?xml version="1.0" encoding="utf-8"?>
+<p:sld xmlns:a="http://schemas.openxmlformats.org/drawingml/2006/main" xmlns:r="http://schemas.openxmlformats.org/officeDocument/2006/relationships" xmlns:p="http://schemas.openxmlformats.org/presentationml/2006/main">
+  <p:cSld>
+    <p:spTree>
+      <p:nvGrpSpPr>
+        <p:cNvPr id="1" name=""/>
+        <p:cNvGrpSpPr/>
+        <p:nvPr/>
+      </p:nvGrpSpPr>
+      <p:grpSpPr>
+        <a:xfrm>
+          <a:off x="0" y="0"/>
+          <a:ext cx="0" cy="0"/>
+          <a:chOff x="0" y="0"/>
+          <a:chExt cx="0" cy="0"/>
+        </a:xfrm>
+      </p:grpSpPr>
+      <p:sp>
+        <p:nvSpPr>
+          <p:cNvPr id="4" name="Tekstfelt 3"/>
+          <p:cNvSpPr txBox="1"/>
+          <p:nvPr/>
+        </p:nvSpPr>
+        <p:spPr>
+          <a:xfrm>
+            <a:off x="3709852" y="875212"/>
+            <a:ext cx="4049507" cy="5016758"/>
+          </a:xfrm>
+          <a:prstGeom prst="rect">
+            <a:avLst/>
+          </a:prstGeom>
+          <a:noFill/>
+        </p:spPr>
+        <p:txBody>
+          <a:bodyPr wrap="none" rtlCol="0">
+            <a:spAutoFit/>
+          </a:bodyPr>
+          <a:lstStyle/>
+          <a:p>
+            <a:r>
+              <a:rPr lang="da-DK" sz="16000" smtClean="0">
+                <a:solidFill>
+                  <a:schemeClr val="accent6">
+                    <a:lumMod val="75000"/>
+                  </a:schemeClr>
+                </a:solidFill>
+              </a:rPr>
+              <a:t>true</a:t>
+            </a:r>
+          </a:p>
+          <a:p>
+            <a:r>
+              <a:rPr lang="da-DK" sz="16000" smtClean="0">
+                <a:solidFill>
+                  <a:srgbClr val="FF0000"/>
+                </a:solidFill>
+              </a:rPr>
+              <a:t>false</a:t>
+            </a:r>
+            <a:endParaRPr lang="da-DK" sz="16000">
+              <a:solidFill>
+                <a:srgbClr val="FF0000"/>
+              </a:solidFill>
+            </a:endParaRPr>
+          </a:p>
+        </p:txBody>
+      </p:sp>
+    </p:spTree>
+    <p:extLst>
+      <p:ext uri="{BB962C8B-B14F-4D97-AF65-F5344CB8AC3E}">
+        <p14:creationId xmlns:p14="http://schemas.microsoft.com/office/powerpoint/2010/main" val="916824830"/>
+      </p:ext>
+    </p:extLst>
+  </p:cSld>
+  <p:clrMapOvr>
+    <a:masterClrMapping/>
+  </p:clrMapOvr>
+</p:sld>
+</file>
+
+<file path=ppt/slides/slide26.xml><?xml version="1.0" encoding="utf-8"?>
 <p:sld xmlns:a="http://schemas.openxmlformats.org/drawingml/2006/main" xmlns:r="http://schemas.openxmlformats.org/officeDocument/2006/relationships" xmlns:p="http://schemas.openxmlformats.org/presentationml/2006/main">
   <p:cSld>
     <p:spTree>
@@ -8425,7 +8229,7 @@
 </p:sld>
 </file>
 
-<file path=ppt/slides/slide26.xml><?xml version="1.0" encoding="utf-8"?>
+<file path=ppt/slides/slide27.xml><?xml version="1.0" encoding="utf-8"?>
 <p:sld xmlns:a="http://schemas.openxmlformats.org/drawingml/2006/main" xmlns:r="http://schemas.openxmlformats.org/officeDocument/2006/relationships" xmlns:p="http://schemas.openxmlformats.org/presentationml/2006/main">
   <p:cSld>
     <p:spTree>
@@ -8748,13 +8552,13 @@
   <p:clrMapOvr>
     <a:masterClrMapping/>
   </p:clrMapOvr>
-  <mc:AlternateContent xmlns:mc="http://schemas.openxmlformats.org/markup-compatibility/2006">
-    <mc:Choice xmlns:p14="http://schemas.microsoft.com/office/powerpoint/2010/main" Requires="p14">
+  <mc:AlternateContent xmlns:mc="http://schemas.openxmlformats.org/markup-compatibility/2006" xmlns:p14="http://schemas.microsoft.com/office/powerpoint/2010/main">
+    <mc:Choice Requires="p14">
       <p:transition spd="med" p14:dur="700">
         <p:fade/>
       </p:transition>
     </mc:Choice>
-    <mc:Fallback>
+    <mc:Fallback xmlns="">
       <p:transition spd="med">
         <p:fade/>
       </p:transition>
@@ -8770,7 +8574,7 @@
 </p:sld>
 </file>
 
-<file path=ppt/slides/slide27.xml><?xml version="1.0" encoding="utf-8"?>
+<file path=ppt/slides/slide28.xml><?xml version="1.0" encoding="utf-8"?>
 <p:sld xmlns:a="http://schemas.openxmlformats.org/drawingml/2006/main" xmlns:r="http://schemas.openxmlformats.org/officeDocument/2006/relationships" xmlns:p="http://schemas.openxmlformats.org/presentationml/2006/main">
   <p:cSld>
     <p:spTree>
@@ -9095,13 +8899,13 @@
   <p:clrMapOvr>
     <a:masterClrMapping/>
   </p:clrMapOvr>
-  <mc:AlternateContent xmlns:mc="http://schemas.openxmlformats.org/markup-compatibility/2006">
-    <mc:Choice xmlns:p14="http://schemas.microsoft.com/office/powerpoint/2010/main" Requires="p14">
+  <mc:AlternateContent xmlns:mc="http://schemas.openxmlformats.org/markup-compatibility/2006" xmlns:p14="http://schemas.microsoft.com/office/powerpoint/2010/main">
+    <mc:Choice Requires="p14">
       <p:transition spd="med" p14:dur="700">
         <p:fade/>
       </p:transition>
     </mc:Choice>
-    <mc:Fallback>
+    <mc:Fallback xmlns="">
       <p:transition spd="med">
         <p:fade/>
       </p:transition>
@@ -9117,7 +8921,7 @@
 </p:sld>
 </file>
 
-<file path=ppt/slides/slide28.xml><?xml version="1.0" encoding="utf-8"?>
+<file path=ppt/slides/slide29.xml><?xml version="1.0" encoding="utf-8"?>
 <p:sld xmlns:a="http://schemas.openxmlformats.org/drawingml/2006/main" xmlns:r="http://schemas.openxmlformats.org/officeDocument/2006/relationships" xmlns:p="http://schemas.openxmlformats.org/presentationml/2006/main">
   <p:cSld>
     <p:spTree>
@@ -9454,374 +9258,18 @@
   <p:clrMapOvr>
     <a:masterClrMapping/>
   </p:clrMapOvr>
-  <mc:AlternateContent xmlns:mc="http://schemas.openxmlformats.org/markup-compatibility/2006">
-    <mc:Choice xmlns:p14="http://schemas.microsoft.com/office/powerpoint/2010/main" Requires="p14">
+  <mc:AlternateContent xmlns:mc="http://schemas.openxmlformats.org/markup-compatibility/2006" xmlns:p14="http://schemas.microsoft.com/office/powerpoint/2010/main">
+    <mc:Choice Requires="p14">
       <p:transition spd="med" p14:dur="700">
         <p:fade/>
       </p:transition>
     </mc:Choice>
-    <mc:Fallback>
+    <mc:Fallback xmlns="">
       <p:transition spd="med">
         <p:fade/>
       </p:transition>
     </mc:Fallback>
   </mc:AlternateContent>
-  <p:timing>
-    <p:tnLst>
-      <p:par>
-        <p:cTn id="1" dur="indefinite" restart="never" nodeType="tmRoot"/>
-      </p:par>
-    </p:tnLst>
-  </p:timing>
-</p:sld>
-</file>
-
-<file path=ppt/slides/slide29.xml><?xml version="1.0" encoding="utf-8"?>
-<p:sld xmlns:a="http://schemas.openxmlformats.org/drawingml/2006/main" xmlns:r="http://schemas.openxmlformats.org/officeDocument/2006/relationships" xmlns:p="http://schemas.openxmlformats.org/presentationml/2006/main">
-  <p:cSld>
-    <p:spTree>
-      <p:nvGrpSpPr>
-        <p:cNvPr id="1" name=""/>
-        <p:cNvGrpSpPr/>
-        <p:nvPr/>
-      </p:nvGrpSpPr>
-      <p:grpSpPr>
-        <a:xfrm>
-          <a:off x="0" y="0"/>
-          <a:ext cx="0" cy="0"/>
-          <a:chOff x="0" y="0"/>
-          <a:chExt cx="0" cy="0"/>
-        </a:xfrm>
-      </p:grpSpPr>
-      <p:cxnSp>
-        <p:nvCxnSpPr>
-          <p:cNvPr id="6" name="Lige forbindelse 5"/>
-          <p:cNvCxnSpPr/>
-          <p:nvPr/>
-        </p:nvCxnSpPr>
-        <p:spPr>
-          <a:xfrm>
-            <a:off x="2671010" y="2021307"/>
-            <a:ext cx="5895474" cy="3520"/>
-          </a:xfrm>
-          <a:prstGeom prst="line">
-            <a:avLst/>
-          </a:prstGeom>
-          <a:ln w="76200">
-            <a:solidFill>
-              <a:schemeClr val="tx1"/>
-            </a:solidFill>
-          </a:ln>
-        </p:spPr>
-        <p:style>
-          <a:lnRef idx="1">
-            <a:schemeClr val="accent1"/>
-          </a:lnRef>
-          <a:fillRef idx="0">
-            <a:schemeClr val="accent1"/>
-          </a:fillRef>
-          <a:effectRef idx="0">
-            <a:schemeClr val="accent1"/>
-          </a:effectRef>
-          <a:fontRef idx="minor">
-            <a:schemeClr val="tx1"/>
-          </a:fontRef>
-        </p:style>
-      </p:cxnSp>
-      <p:cxnSp>
-        <p:nvCxnSpPr>
-          <p:cNvPr id="9" name="Lige forbindelse 8"/>
-          <p:cNvCxnSpPr/>
-          <p:nvPr/>
-        </p:nvCxnSpPr>
-        <p:spPr>
-          <a:xfrm>
-            <a:off x="2671009" y="4537912"/>
-            <a:ext cx="6009775" cy="1053"/>
-          </a:xfrm>
-          <a:prstGeom prst="line">
-            <a:avLst/>
-          </a:prstGeom>
-          <a:ln w="76200">
-            <a:solidFill>
-              <a:schemeClr val="tx1"/>
-            </a:solidFill>
-          </a:ln>
-        </p:spPr>
-        <p:style>
-          <a:lnRef idx="1">
-            <a:schemeClr val="accent1"/>
-          </a:lnRef>
-          <a:fillRef idx="0">
-            <a:schemeClr val="accent1"/>
-          </a:fillRef>
-          <a:effectRef idx="0">
-            <a:schemeClr val="accent1"/>
-          </a:effectRef>
-          <a:fontRef idx="minor">
-            <a:schemeClr val="tx1"/>
-          </a:fontRef>
-        </p:style>
-      </p:cxnSp>
-      <p:cxnSp>
-        <p:nvCxnSpPr>
-          <p:cNvPr id="10" name="Lige forbindelse 9"/>
-          <p:cNvCxnSpPr/>
-          <p:nvPr/>
-        </p:nvCxnSpPr>
-        <p:spPr>
-          <a:xfrm flipH="1" flipV="1">
-            <a:off x="4656223" y="2051384"/>
-            <a:ext cx="6014" cy="1170252"/>
-          </a:xfrm>
-          <a:prstGeom prst="line">
-            <a:avLst/>
-          </a:prstGeom>
-          <a:ln w="76200">
-            <a:solidFill>
-              <a:srgbClr val="FF0000"/>
-            </a:solidFill>
-            <a:prstDash val="sysDash"/>
-          </a:ln>
-        </p:spPr>
-        <p:style>
-          <a:lnRef idx="1">
-            <a:schemeClr val="accent1"/>
-          </a:lnRef>
-          <a:fillRef idx="0">
-            <a:schemeClr val="accent1"/>
-          </a:fillRef>
-          <a:effectRef idx="0">
-            <a:schemeClr val="accent1"/>
-          </a:effectRef>
-          <a:fontRef idx="minor">
-            <a:schemeClr val="tx1"/>
-          </a:fontRef>
-        </p:style>
-      </p:cxnSp>
-      <p:cxnSp>
-        <p:nvCxnSpPr>
-          <p:cNvPr id="13" name="Lige forbindelse 12"/>
-          <p:cNvCxnSpPr/>
-          <p:nvPr/>
-        </p:nvCxnSpPr>
-        <p:spPr>
-          <a:xfrm flipV="1">
-            <a:off x="6823913" y="3260556"/>
-            <a:ext cx="0" cy="1247274"/>
-          </a:xfrm>
-          <a:prstGeom prst="line">
-            <a:avLst/>
-          </a:prstGeom>
-          <a:ln w="76200">
-            <a:solidFill>
-              <a:srgbClr val="FF0000"/>
-            </a:solidFill>
-            <a:prstDash val="sysDash"/>
-          </a:ln>
-        </p:spPr>
-        <p:style>
-          <a:lnRef idx="1">
-            <a:schemeClr val="accent1"/>
-          </a:lnRef>
-          <a:fillRef idx="0">
-            <a:schemeClr val="accent1"/>
-          </a:fillRef>
-          <a:effectRef idx="0">
-            <a:schemeClr val="accent1"/>
-          </a:effectRef>
-          <a:fontRef idx="minor">
-            <a:schemeClr val="tx1"/>
-          </a:fontRef>
-        </p:style>
-      </p:cxnSp>
-      <p:sp>
-        <p:nvSpPr>
-          <p:cNvPr id="16" name="Tekstfelt 15"/>
-          <p:cNvSpPr txBox="1"/>
-          <p:nvPr/>
-        </p:nvSpPr>
-        <p:spPr>
-          <a:xfrm>
-            <a:off x="4276169" y="851055"/>
-            <a:ext cx="2486578" cy="1200329"/>
-          </a:xfrm>
-          <a:prstGeom prst="rect">
-            <a:avLst/>
-          </a:prstGeom>
-          <a:noFill/>
-        </p:spPr>
-        <p:txBody>
-          <a:bodyPr wrap="none" rtlCol="0">
-            <a:spAutoFit/>
-          </a:bodyPr>
-          <a:lstStyle/>
-          <a:p>
-            <a:r>
-              <a:rPr lang="da-DK" sz="7200" smtClean="0">
-                <a:solidFill>
-                  <a:srgbClr val="FF0000"/>
-                </a:solidFill>
-              </a:rPr>
-              <a:t>A </a:t>
-            </a:r>
-            <a:r>
-              <a:rPr lang="da-DK" sz="7200" smtClean="0"/>
-              <a:t>||</a:t>
-            </a:r>
-            <a:r>
-              <a:rPr lang="da-DK" sz="7200" smtClean="0">
-                <a:solidFill>
-                  <a:srgbClr val="FF0000"/>
-                </a:solidFill>
-              </a:rPr>
-              <a:t> B</a:t>
-            </a:r>
-            <a:endParaRPr lang="da-DK" sz="7200">
-              <a:solidFill>
-                <a:srgbClr val="FF0000"/>
-              </a:solidFill>
-            </a:endParaRPr>
-          </a:p>
-        </p:txBody>
-      </p:sp>
-      <p:cxnSp>
-        <p:nvCxnSpPr>
-          <p:cNvPr id="11" name="Lige forbindelse 10"/>
-          <p:cNvCxnSpPr/>
-          <p:nvPr/>
-        </p:nvCxnSpPr>
-        <p:spPr>
-          <a:xfrm>
-            <a:off x="4656223" y="3275778"/>
-            <a:ext cx="2167690" cy="0"/>
-          </a:xfrm>
-          <a:prstGeom prst="line">
-            <a:avLst/>
-          </a:prstGeom>
-          <a:ln w="76200">
-            <a:solidFill>
-              <a:schemeClr val="tx1"/>
-            </a:solidFill>
-          </a:ln>
-        </p:spPr>
-        <p:style>
-          <a:lnRef idx="1">
-            <a:schemeClr val="accent1"/>
-          </a:lnRef>
-          <a:fillRef idx="0">
-            <a:schemeClr val="accent1"/>
-          </a:fillRef>
-          <a:effectRef idx="0">
-            <a:schemeClr val="accent1"/>
-          </a:effectRef>
-          <a:fontRef idx="minor">
-            <a:schemeClr val="tx1"/>
-          </a:fontRef>
-        </p:style>
-      </p:cxnSp>
-      <p:sp>
-        <p:nvSpPr>
-          <p:cNvPr id="15" name="Smilende ansigt 14"/>
-          <p:cNvSpPr/>
-          <p:nvPr/>
-        </p:nvSpPr>
-        <p:spPr>
-          <a:xfrm>
-            <a:off x="2671009" y="2743200"/>
-            <a:ext cx="1094875" cy="1082841"/>
-          </a:xfrm>
-          <a:prstGeom prst="smileyFace">
-            <a:avLst/>
-          </a:prstGeom>
-          <a:solidFill>
-            <a:schemeClr val="accent4">
-              <a:lumMod val="75000"/>
-            </a:schemeClr>
-          </a:solidFill>
-          <a:ln>
-            <a:solidFill>
-              <a:schemeClr val="tx1"/>
-            </a:solidFill>
-          </a:ln>
-        </p:spPr>
-        <p:style>
-          <a:lnRef idx="2">
-            <a:schemeClr val="accent1">
-              <a:shade val="50000"/>
-            </a:schemeClr>
-          </a:lnRef>
-          <a:fillRef idx="1">
-            <a:schemeClr val="accent1"/>
-          </a:fillRef>
-          <a:effectRef idx="0">
-            <a:schemeClr val="accent1"/>
-          </a:effectRef>
-          <a:fontRef idx="minor">
-            <a:schemeClr val="lt1"/>
-          </a:fontRef>
-        </p:style>
-        <p:txBody>
-          <a:bodyPr rtlCol="0" anchor="ctr"/>
-          <a:lstStyle/>
-          <a:p>
-            <a:pPr algn="ctr"/>
-            <a:endParaRPr lang="da-DK"/>
-          </a:p>
-        </p:txBody>
-      </p:sp>
-      <p:sp>
-        <p:nvSpPr>
-          <p:cNvPr id="18" name="Tekstfelt 17"/>
-          <p:cNvSpPr txBox="1"/>
-          <p:nvPr/>
-        </p:nvSpPr>
-        <p:spPr>
-          <a:xfrm>
-            <a:off x="7534721" y="2389501"/>
-            <a:ext cx="808235" cy="1569660"/>
-          </a:xfrm>
-          <a:prstGeom prst="rect">
-            <a:avLst/>
-          </a:prstGeom>
-          <a:noFill/>
-        </p:spPr>
-        <p:txBody>
-          <a:bodyPr wrap="none" rtlCol="0">
-            <a:spAutoFit/>
-          </a:bodyPr>
-          <a:lstStyle/>
-          <a:p>
-            <a:r>
-              <a:rPr lang="da-DK" sz="9600" smtClean="0">
-                <a:solidFill>
-                  <a:schemeClr val="accent4">
-                    <a:lumMod val="75000"/>
-                  </a:schemeClr>
-                </a:solidFill>
-              </a:rPr>
-              <a:t>$</a:t>
-            </a:r>
-            <a:endParaRPr lang="da-DK" sz="9600">
-              <a:solidFill>
-                <a:schemeClr val="accent4">
-                  <a:lumMod val="75000"/>
-                </a:schemeClr>
-              </a:solidFill>
-            </a:endParaRPr>
-          </a:p>
-        </p:txBody>
-      </p:sp>
-    </p:spTree>
-    <p:extLst>
-      <p:ext uri="{BB962C8B-B14F-4D97-AF65-F5344CB8AC3E}">
-        <p14:creationId xmlns:p14="http://schemas.microsoft.com/office/powerpoint/2010/main" val="3846949719"/>
-      </p:ext>
-    </p:extLst>
-  </p:cSld>
-  <p:clrMapOvr>
-    <a:masterClrMapping/>
-  </p:clrMapOvr>
   <p:timing>
     <p:tnLst>
       <p:par>
@@ -11971,6 +11419,362 @@
           </a:prstGeom>
           <a:ln w="76200">
             <a:solidFill>
+              <a:srgbClr val="FF0000"/>
+            </a:solidFill>
+            <a:prstDash val="sysDash"/>
+          </a:ln>
+        </p:spPr>
+        <p:style>
+          <a:lnRef idx="1">
+            <a:schemeClr val="accent1"/>
+          </a:lnRef>
+          <a:fillRef idx="0">
+            <a:schemeClr val="accent1"/>
+          </a:fillRef>
+          <a:effectRef idx="0">
+            <a:schemeClr val="accent1"/>
+          </a:effectRef>
+          <a:fontRef idx="minor">
+            <a:schemeClr val="tx1"/>
+          </a:fontRef>
+        </p:style>
+      </p:cxnSp>
+      <p:cxnSp>
+        <p:nvCxnSpPr>
+          <p:cNvPr id="13" name="Lige forbindelse 12"/>
+          <p:cNvCxnSpPr/>
+          <p:nvPr/>
+        </p:nvCxnSpPr>
+        <p:spPr>
+          <a:xfrm flipV="1">
+            <a:off x="6823913" y="3260556"/>
+            <a:ext cx="0" cy="1247274"/>
+          </a:xfrm>
+          <a:prstGeom prst="line">
+            <a:avLst/>
+          </a:prstGeom>
+          <a:ln w="76200">
+            <a:solidFill>
+              <a:srgbClr val="FF0000"/>
+            </a:solidFill>
+            <a:prstDash val="sysDash"/>
+          </a:ln>
+        </p:spPr>
+        <p:style>
+          <a:lnRef idx="1">
+            <a:schemeClr val="accent1"/>
+          </a:lnRef>
+          <a:fillRef idx="0">
+            <a:schemeClr val="accent1"/>
+          </a:fillRef>
+          <a:effectRef idx="0">
+            <a:schemeClr val="accent1"/>
+          </a:effectRef>
+          <a:fontRef idx="minor">
+            <a:schemeClr val="tx1"/>
+          </a:fontRef>
+        </p:style>
+      </p:cxnSp>
+      <p:sp>
+        <p:nvSpPr>
+          <p:cNvPr id="16" name="Tekstfelt 15"/>
+          <p:cNvSpPr txBox="1"/>
+          <p:nvPr/>
+        </p:nvSpPr>
+        <p:spPr>
+          <a:xfrm>
+            <a:off x="4276169" y="851055"/>
+            <a:ext cx="2486578" cy="1200329"/>
+          </a:xfrm>
+          <a:prstGeom prst="rect">
+            <a:avLst/>
+          </a:prstGeom>
+          <a:noFill/>
+        </p:spPr>
+        <p:txBody>
+          <a:bodyPr wrap="none" rtlCol="0">
+            <a:spAutoFit/>
+          </a:bodyPr>
+          <a:lstStyle/>
+          <a:p>
+            <a:r>
+              <a:rPr lang="da-DK" sz="7200" smtClean="0">
+                <a:solidFill>
+                  <a:srgbClr val="FF0000"/>
+                </a:solidFill>
+              </a:rPr>
+              <a:t>A </a:t>
+            </a:r>
+            <a:r>
+              <a:rPr lang="da-DK" sz="7200" smtClean="0"/>
+              <a:t>||</a:t>
+            </a:r>
+            <a:r>
+              <a:rPr lang="da-DK" sz="7200" smtClean="0">
+                <a:solidFill>
+                  <a:srgbClr val="FF0000"/>
+                </a:solidFill>
+              </a:rPr>
+              <a:t> B</a:t>
+            </a:r>
+            <a:endParaRPr lang="da-DK" sz="7200">
+              <a:solidFill>
+                <a:srgbClr val="FF0000"/>
+              </a:solidFill>
+            </a:endParaRPr>
+          </a:p>
+        </p:txBody>
+      </p:sp>
+      <p:cxnSp>
+        <p:nvCxnSpPr>
+          <p:cNvPr id="11" name="Lige forbindelse 10"/>
+          <p:cNvCxnSpPr/>
+          <p:nvPr/>
+        </p:nvCxnSpPr>
+        <p:spPr>
+          <a:xfrm>
+            <a:off x="4656223" y="3275778"/>
+            <a:ext cx="2167690" cy="0"/>
+          </a:xfrm>
+          <a:prstGeom prst="line">
+            <a:avLst/>
+          </a:prstGeom>
+          <a:ln w="76200">
+            <a:solidFill>
+              <a:schemeClr val="tx1"/>
+            </a:solidFill>
+          </a:ln>
+        </p:spPr>
+        <p:style>
+          <a:lnRef idx="1">
+            <a:schemeClr val="accent1"/>
+          </a:lnRef>
+          <a:fillRef idx="0">
+            <a:schemeClr val="accent1"/>
+          </a:fillRef>
+          <a:effectRef idx="0">
+            <a:schemeClr val="accent1"/>
+          </a:effectRef>
+          <a:fontRef idx="minor">
+            <a:schemeClr val="tx1"/>
+          </a:fontRef>
+        </p:style>
+      </p:cxnSp>
+      <p:sp>
+        <p:nvSpPr>
+          <p:cNvPr id="15" name="Smilende ansigt 14"/>
+          <p:cNvSpPr/>
+          <p:nvPr/>
+        </p:nvSpPr>
+        <p:spPr>
+          <a:xfrm>
+            <a:off x="2671009" y="2743200"/>
+            <a:ext cx="1094875" cy="1082841"/>
+          </a:xfrm>
+          <a:prstGeom prst="smileyFace">
+            <a:avLst/>
+          </a:prstGeom>
+          <a:solidFill>
+            <a:schemeClr val="accent4">
+              <a:lumMod val="75000"/>
+            </a:schemeClr>
+          </a:solidFill>
+          <a:ln>
+            <a:solidFill>
+              <a:schemeClr val="tx1"/>
+            </a:solidFill>
+          </a:ln>
+        </p:spPr>
+        <p:style>
+          <a:lnRef idx="2">
+            <a:schemeClr val="accent1">
+              <a:shade val="50000"/>
+            </a:schemeClr>
+          </a:lnRef>
+          <a:fillRef idx="1">
+            <a:schemeClr val="accent1"/>
+          </a:fillRef>
+          <a:effectRef idx="0">
+            <a:schemeClr val="accent1"/>
+          </a:effectRef>
+          <a:fontRef idx="minor">
+            <a:schemeClr val="lt1"/>
+          </a:fontRef>
+        </p:style>
+        <p:txBody>
+          <a:bodyPr rtlCol="0" anchor="ctr"/>
+          <a:lstStyle/>
+          <a:p>
+            <a:pPr algn="ctr"/>
+            <a:endParaRPr lang="da-DK"/>
+          </a:p>
+        </p:txBody>
+      </p:sp>
+      <p:sp>
+        <p:nvSpPr>
+          <p:cNvPr id="18" name="Tekstfelt 17"/>
+          <p:cNvSpPr txBox="1"/>
+          <p:nvPr/>
+        </p:nvSpPr>
+        <p:spPr>
+          <a:xfrm>
+            <a:off x="7534721" y="2389501"/>
+            <a:ext cx="808235" cy="1569660"/>
+          </a:xfrm>
+          <a:prstGeom prst="rect">
+            <a:avLst/>
+          </a:prstGeom>
+          <a:noFill/>
+        </p:spPr>
+        <p:txBody>
+          <a:bodyPr wrap="none" rtlCol="0">
+            <a:spAutoFit/>
+          </a:bodyPr>
+          <a:lstStyle/>
+          <a:p>
+            <a:r>
+              <a:rPr lang="da-DK" sz="9600" smtClean="0">
+                <a:solidFill>
+                  <a:schemeClr val="accent4">
+                    <a:lumMod val="75000"/>
+                  </a:schemeClr>
+                </a:solidFill>
+              </a:rPr>
+              <a:t>$</a:t>
+            </a:r>
+            <a:endParaRPr lang="da-DK" sz="9600">
+              <a:solidFill>
+                <a:schemeClr val="accent4">
+                  <a:lumMod val="75000"/>
+                </a:schemeClr>
+              </a:solidFill>
+            </a:endParaRPr>
+          </a:p>
+        </p:txBody>
+      </p:sp>
+    </p:spTree>
+    <p:extLst>
+      <p:ext uri="{BB962C8B-B14F-4D97-AF65-F5344CB8AC3E}">
+        <p14:creationId xmlns:p14="http://schemas.microsoft.com/office/powerpoint/2010/main" val="3846949719"/>
+      </p:ext>
+    </p:extLst>
+  </p:cSld>
+  <p:clrMapOvr>
+    <a:masterClrMapping/>
+  </p:clrMapOvr>
+  <p:timing>
+    <p:tnLst>
+      <p:par>
+        <p:cTn id="1" dur="indefinite" restart="never" nodeType="tmRoot"/>
+      </p:par>
+    </p:tnLst>
+  </p:timing>
+</p:sld>
+</file>
+
+<file path=ppt/slides/slide31.xml><?xml version="1.0" encoding="utf-8"?>
+<p:sld xmlns:a="http://schemas.openxmlformats.org/drawingml/2006/main" xmlns:r="http://schemas.openxmlformats.org/officeDocument/2006/relationships" xmlns:p="http://schemas.openxmlformats.org/presentationml/2006/main">
+  <p:cSld>
+    <p:spTree>
+      <p:nvGrpSpPr>
+        <p:cNvPr id="1" name=""/>
+        <p:cNvGrpSpPr/>
+        <p:nvPr/>
+      </p:nvGrpSpPr>
+      <p:grpSpPr>
+        <a:xfrm>
+          <a:off x="0" y="0"/>
+          <a:ext cx="0" cy="0"/>
+          <a:chOff x="0" y="0"/>
+          <a:chExt cx="0" cy="0"/>
+        </a:xfrm>
+      </p:grpSpPr>
+      <p:cxnSp>
+        <p:nvCxnSpPr>
+          <p:cNvPr id="6" name="Lige forbindelse 5"/>
+          <p:cNvCxnSpPr/>
+          <p:nvPr/>
+        </p:nvCxnSpPr>
+        <p:spPr>
+          <a:xfrm>
+            <a:off x="2671010" y="2021307"/>
+            <a:ext cx="5895474" cy="3520"/>
+          </a:xfrm>
+          <a:prstGeom prst="line">
+            <a:avLst/>
+          </a:prstGeom>
+          <a:ln w="76200">
+            <a:solidFill>
+              <a:schemeClr val="tx1"/>
+            </a:solidFill>
+          </a:ln>
+        </p:spPr>
+        <p:style>
+          <a:lnRef idx="1">
+            <a:schemeClr val="accent1"/>
+          </a:lnRef>
+          <a:fillRef idx="0">
+            <a:schemeClr val="accent1"/>
+          </a:fillRef>
+          <a:effectRef idx="0">
+            <a:schemeClr val="accent1"/>
+          </a:effectRef>
+          <a:fontRef idx="minor">
+            <a:schemeClr val="tx1"/>
+          </a:fontRef>
+        </p:style>
+      </p:cxnSp>
+      <p:cxnSp>
+        <p:nvCxnSpPr>
+          <p:cNvPr id="9" name="Lige forbindelse 8"/>
+          <p:cNvCxnSpPr/>
+          <p:nvPr/>
+        </p:nvCxnSpPr>
+        <p:spPr>
+          <a:xfrm>
+            <a:off x="2671009" y="4537912"/>
+            <a:ext cx="6009775" cy="1053"/>
+          </a:xfrm>
+          <a:prstGeom prst="line">
+            <a:avLst/>
+          </a:prstGeom>
+          <a:ln w="76200">
+            <a:solidFill>
+              <a:schemeClr val="tx1"/>
+            </a:solidFill>
+          </a:ln>
+        </p:spPr>
+        <p:style>
+          <a:lnRef idx="1">
+            <a:schemeClr val="accent1"/>
+          </a:lnRef>
+          <a:fillRef idx="0">
+            <a:schemeClr val="accent1"/>
+          </a:fillRef>
+          <a:effectRef idx="0">
+            <a:schemeClr val="accent1"/>
+          </a:effectRef>
+          <a:fontRef idx="minor">
+            <a:schemeClr val="tx1"/>
+          </a:fontRef>
+        </p:style>
+      </p:cxnSp>
+      <p:cxnSp>
+        <p:nvCxnSpPr>
+          <p:cNvPr id="10" name="Lige forbindelse 9"/>
+          <p:cNvCxnSpPr/>
+          <p:nvPr/>
+        </p:nvCxnSpPr>
+        <p:spPr>
+          <a:xfrm flipH="1" flipV="1">
+            <a:off x="4656223" y="2051384"/>
+            <a:ext cx="6014" cy="1170252"/>
+          </a:xfrm>
+          <a:prstGeom prst="line">
+            <a:avLst/>
+          </a:prstGeom>
+          <a:ln w="76200">
+            <a:solidFill>
               <a:schemeClr val="accent6">
                 <a:lumMod val="75000"/>
               </a:schemeClr>
@@ -12226,13 +12030,13 @@
   <p:clrMapOvr>
     <a:masterClrMapping/>
   </p:clrMapOvr>
-  <mc:AlternateContent xmlns:mc="http://schemas.openxmlformats.org/markup-compatibility/2006">
-    <mc:Choice xmlns:p14="http://schemas.microsoft.com/office/powerpoint/2010/main" Requires="p14">
+  <mc:AlternateContent xmlns:mc="http://schemas.openxmlformats.org/markup-compatibility/2006" xmlns:p14="http://schemas.microsoft.com/office/powerpoint/2010/main">
+    <mc:Choice Requires="p14">
       <p:transition spd="med" p14:dur="700">
         <p:fade/>
       </p:transition>
     </mc:Choice>
-    <mc:Fallback>
+    <mc:Fallback xmlns="">
       <p:transition spd="med">
         <p:fade/>
       </p:transition>
@@ -12248,7 +12052,7 @@
 </p:sld>
 </file>
 
-<file path=ppt/slides/slide31.xml><?xml version="1.0" encoding="utf-8"?>
+<file path=ppt/slides/slide32.xml><?xml version="1.0" encoding="utf-8"?>
 <p:sld xmlns:a="http://schemas.openxmlformats.org/drawingml/2006/main" xmlns:r="http://schemas.openxmlformats.org/officeDocument/2006/relationships" xmlns:p="http://schemas.openxmlformats.org/presentationml/2006/main">
   <p:cSld>
     <p:spTree>
@@ -12608,13 +12412,13 @@
   <p:clrMapOvr>
     <a:masterClrMapping/>
   </p:clrMapOvr>
-  <mc:AlternateContent xmlns:mc="http://schemas.openxmlformats.org/markup-compatibility/2006">
-    <mc:Choice xmlns:p14="http://schemas.microsoft.com/office/powerpoint/2010/main" Requires="p14">
+  <mc:AlternateContent xmlns:mc="http://schemas.openxmlformats.org/markup-compatibility/2006" xmlns:p14="http://schemas.microsoft.com/office/powerpoint/2010/main">
+    <mc:Choice Requires="p14">
       <p:transition spd="med" p14:dur="700">
         <p:fade/>
       </p:transition>
     </mc:Choice>
-    <mc:Fallback>
+    <mc:Fallback xmlns="">
       <p:transition spd="med">
         <p:fade/>
       </p:transition>
@@ -12630,7 +12434,7 @@
 </p:sld>
 </file>
 
-<file path=ppt/slides/slide32.xml><?xml version="1.0" encoding="utf-8"?>
+<file path=ppt/slides/slide33.xml><?xml version="1.0" encoding="utf-8"?>
 <p:sld xmlns:a="http://schemas.openxmlformats.org/drawingml/2006/main" xmlns:r="http://schemas.openxmlformats.org/officeDocument/2006/relationships" xmlns:p="http://schemas.openxmlformats.org/presentationml/2006/main">
   <p:cSld>
     <p:spTree>
@@ -13002,13 +12806,13 @@
   <p:clrMapOvr>
     <a:masterClrMapping/>
   </p:clrMapOvr>
-  <mc:AlternateContent xmlns:mc="http://schemas.openxmlformats.org/markup-compatibility/2006">
-    <mc:Choice xmlns:p14="http://schemas.microsoft.com/office/powerpoint/2010/main" Requires="p14">
+  <mc:AlternateContent xmlns:mc="http://schemas.openxmlformats.org/markup-compatibility/2006" xmlns:p14="http://schemas.microsoft.com/office/powerpoint/2010/main">
+    <mc:Choice Requires="p14">
       <p:transition spd="med" p14:dur="700">
         <p:fade/>
       </p:transition>
     </mc:Choice>
-    <mc:Fallback>
+    <mc:Fallback xmlns="">
       <p:transition spd="med">
         <p:fade/>
       </p:transition>
@@ -13024,7 +12828,7 @@
 </p:sld>
 </file>
 
-<file path=ppt/slides/slide33.xml><?xml version="1.0" encoding="utf-8"?>
+<file path=ppt/slides/slide34.xml><?xml version="1.0" encoding="utf-8"?>
 <p:sld xmlns:a="http://schemas.openxmlformats.org/drawingml/2006/main" xmlns:r="http://schemas.openxmlformats.org/officeDocument/2006/relationships" xmlns:p="http://schemas.openxmlformats.org/presentationml/2006/main">
   <p:cSld>
     <p:spTree>
@@ -13303,7 +13107,7 @@
 </p:sld>
 </file>
 
-<file path=ppt/slides/slide34.xml><?xml version="1.0" encoding="utf-8"?>
+<file path=ppt/slides/slide35.xml><?xml version="1.0" encoding="utf-8"?>
 <p:sld xmlns:a="http://schemas.openxmlformats.org/drawingml/2006/main" xmlns:r="http://schemas.openxmlformats.org/officeDocument/2006/relationships" xmlns:p="http://schemas.openxmlformats.org/presentationml/2006/main">
   <p:cSld>
     <p:spTree>
@@ -13574,13 +13378,13 @@
   <p:clrMapOvr>
     <a:masterClrMapping/>
   </p:clrMapOvr>
-  <mc:AlternateContent xmlns:mc="http://schemas.openxmlformats.org/markup-compatibility/2006">
-    <mc:Choice xmlns:p14="http://schemas.microsoft.com/office/powerpoint/2010/main" Requires="p14">
+  <mc:AlternateContent xmlns:mc="http://schemas.openxmlformats.org/markup-compatibility/2006" xmlns:p14="http://schemas.microsoft.com/office/powerpoint/2010/main">
+    <mc:Choice Requires="p14">
       <p:transition spd="med" p14:dur="700">
         <p:fade/>
       </p:transition>
     </mc:Choice>
-    <mc:Fallback>
+    <mc:Fallback xmlns="">
       <p:transition spd="med">
         <p:fade/>
       </p:transition>

</xml_diff>